<commit_message>
chg: Updated OPAC_DPIs_for target folder v2 with new DPIs chg: Updated OPAC DPIs for TGT list v2 CombatFlite file with the new DPIs chg: Formatted target folders produced (lower resolution to save space and loading), made some images black/white to simulate satelite imagry
</commit_message>
<xml_diff>
--- a/INTEL/Target Folders/SRN/SRNTGT056 Oz Imandra Bridge E105.pptx
+++ b/INTEL/Target Folders/SRN/SRNTGT056 Oz Imandra Bridge E105.pptx
@@ -109,7 +109,7 @@
   </p:defaultTextStyle>
   <p:extLst>
     <p:ext uri="{EFAFB233-063F-42B5-8137-9DF3F51BA10A}">
-      <p15:sldGuideLst xmlns:p15="http://schemas.microsoft.com/office/powerpoint/2012/main">
+      <p15:sldGuideLst xmlns:p15="http://schemas.microsoft.com/office/powerpoint/2012/main" xmlns="">
         <p15:guide id="1" orient="horz" pos="1620">
           <p15:clr>
             <a:srgbClr val="A4A3A4"/>
@@ -3269,7 +3269,7 @@
           <p:nvPr/>
         </p:nvPicPr>
         <p:blipFill>
-          <a:blip r:embed="rId14" cstate="print"/>
+          <a:blip r:embed="rId14" cstate="screen"/>
           <a:srcRect/>
           <a:stretch>
             <a:fillRect/>
@@ -3799,7 +3799,7 @@
           <p:cNvPr id="28" name="Kép 27">
             <a:extLst>
               <a:ext uri="{FF2B5EF4-FFF2-40B4-BE49-F238E27FC236}">
-                <a16:creationId xmlns:a16="http://schemas.microsoft.com/office/drawing/2014/main" id="{B4B9A08F-DAC1-BB52-5D76-5BE461FAF252}"/>
+                <a16:creationId xmlns:a16="http://schemas.microsoft.com/office/drawing/2014/main" xmlns="" id="{B4B9A08F-DAC1-BB52-5D76-5BE461FAF252}"/>
               </a:ext>
             </a:extLst>
           </p:cNvPr>
@@ -3809,7 +3809,7 @@
           <p:nvPr/>
         </p:nvPicPr>
         <p:blipFill>
-          <a:blip r:embed="rId2"/>
+          <a:blip r:embed="rId2" cstate="screen"/>
           <a:stretch>
             <a:fillRect/>
           </a:stretch>
@@ -3829,7 +3829,7 @@
           <p:cNvPr id="24" name="Kép 23">
             <a:extLst>
               <a:ext uri="{FF2B5EF4-FFF2-40B4-BE49-F238E27FC236}">
-                <a16:creationId xmlns:a16="http://schemas.microsoft.com/office/drawing/2014/main" id="{E8DD9508-0C78-0302-EB78-03949F07A04C}"/>
+                <a16:creationId xmlns:a16="http://schemas.microsoft.com/office/drawing/2014/main" xmlns="" id="{E8DD9508-0C78-0302-EB78-03949F07A04C}"/>
               </a:ext>
             </a:extLst>
           </p:cNvPr>
@@ -3839,7 +3839,7 @@
           <p:nvPr/>
         </p:nvPicPr>
         <p:blipFill>
-          <a:blip r:embed="rId3"/>
+          <a:blip r:embed="rId3" cstate="screen"/>
           <a:stretch>
             <a:fillRect/>
           </a:stretch>
@@ -4146,7 +4146,7 @@
           <p:cNvPr id="21" name="Prostokąt 33">
             <a:extLst>
               <a:ext uri="{FF2B5EF4-FFF2-40B4-BE49-F238E27FC236}">
-                <a16:creationId xmlns:a16="http://schemas.microsoft.com/office/drawing/2014/main" id="{E49849C0-5340-FFB1-A5AC-D1BDAE90C0E4}"/>
+                <a16:creationId xmlns:a16="http://schemas.microsoft.com/office/drawing/2014/main" xmlns="" id="{E49849C0-5340-FFB1-A5AC-D1BDAE90C0E4}"/>
               </a:ext>
             </a:extLst>
           </p:cNvPr>
@@ -4285,7 +4285,7 @@
           <p:cNvPr id="33" name="Prostokąt 36">
             <a:extLst>
               <a:ext uri="{FF2B5EF4-FFF2-40B4-BE49-F238E27FC236}">
-                <a16:creationId xmlns:a16="http://schemas.microsoft.com/office/drawing/2014/main" id="{436C7B94-5D55-3D78-833F-99BA8488EC5C}"/>
+                <a16:creationId xmlns:a16="http://schemas.microsoft.com/office/drawing/2014/main" xmlns="" id="{436C7B94-5D55-3D78-833F-99BA8488EC5C}"/>
               </a:ext>
             </a:extLst>
           </p:cNvPr>
@@ -4390,7 +4390,7 @@
           <p:cNvPr id="39" name="Háromszög 38">
             <a:extLst>
               <a:ext uri="{FF2B5EF4-FFF2-40B4-BE49-F238E27FC236}">
-                <a16:creationId xmlns:a16="http://schemas.microsoft.com/office/drawing/2014/main" id="{599FE571-AEAA-6E24-C9CB-1CDF64FC0761}"/>
+                <a16:creationId xmlns:a16="http://schemas.microsoft.com/office/drawing/2014/main" xmlns="" id="{599FE571-AEAA-6E24-C9CB-1CDF64FC0761}"/>
               </a:ext>
             </a:extLst>
           </p:cNvPr>
@@ -4442,7 +4442,7 @@
           <p:cNvPr id="51" name="Téglalap 50">
             <a:extLst>
               <a:ext uri="{FF2B5EF4-FFF2-40B4-BE49-F238E27FC236}">
-                <a16:creationId xmlns:a16="http://schemas.microsoft.com/office/drawing/2014/main" id="{849F8394-CDE0-9EB4-0A10-314515E83EC0}"/>
+                <a16:creationId xmlns:a16="http://schemas.microsoft.com/office/drawing/2014/main" xmlns="" id="{849F8394-CDE0-9EB4-0A10-314515E83EC0}"/>
               </a:ext>
             </a:extLst>
           </p:cNvPr>
@@ -4493,7 +4493,7 @@
           <p:cNvPr id="4" name="Kép 3">
             <a:extLst>
               <a:ext uri="{FF2B5EF4-FFF2-40B4-BE49-F238E27FC236}">
-                <a16:creationId xmlns:a16="http://schemas.microsoft.com/office/drawing/2014/main" id="{2582332E-BE2D-6281-C5B6-D4E7E034C860}"/>
+                <a16:creationId xmlns:a16="http://schemas.microsoft.com/office/drawing/2014/main" xmlns="" id="{2582332E-BE2D-6281-C5B6-D4E7E034C860}"/>
               </a:ext>
             </a:extLst>
           </p:cNvPr>
@@ -4506,7 +4506,7 @@
           <a:blip r:embed="rId4" cstate="print">
             <a:extLst>
               <a:ext uri="{28A0092B-C50C-407E-A947-70E740481C1C}">
-                <a14:useLocalDpi xmlns:a14="http://schemas.microsoft.com/office/drawing/2010/main" val="0"/>
+                <a14:useLocalDpi xmlns:a14="http://schemas.microsoft.com/office/drawing/2010/main" xmlns="" val="0"/>
               </a:ext>
             </a:extLst>
           </a:blip>
@@ -4529,7 +4529,7 @@
           <p:cNvPr id="6" name="Kép 5">
             <a:extLst>
               <a:ext uri="{FF2B5EF4-FFF2-40B4-BE49-F238E27FC236}">
-                <a16:creationId xmlns:a16="http://schemas.microsoft.com/office/drawing/2014/main" id="{8F557E24-D936-7AF1-2207-47EEDE09D66A}"/>
+                <a16:creationId xmlns:a16="http://schemas.microsoft.com/office/drawing/2014/main" xmlns="" id="{8F557E24-D936-7AF1-2207-47EEDE09D66A}"/>
               </a:ext>
             </a:extLst>
           </p:cNvPr>
@@ -4542,7 +4542,7 @@
           <a:blip r:embed="rId5" cstate="print">
             <a:extLst>
               <a:ext uri="{28A0092B-C50C-407E-A947-70E740481C1C}">
-                <a14:useLocalDpi xmlns:a14="http://schemas.microsoft.com/office/drawing/2010/main" val="0"/>
+                <a14:useLocalDpi xmlns:a14="http://schemas.microsoft.com/office/drawing/2010/main" xmlns="" val="0"/>
               </a:ext>
             </a:extLst>
           </a:blip>

</xml_diff>

<commit_message>
corrected previous targets, and added SRNTGT073
</commit_message>
<xml_diff>
--- a/INTEL/Target Folders/SRN/SRNTGT056 Oz Imandra Bridge E105.pptx
+++ b/INTEL/Target Folders/SRN/SRNTGT056 Oz Imandra Bridge E105.pptx
@@ -109,7 +109,7 @@
   </p:defaultTextStyle>
   <p:extLst>
     <p:ext uri="{EFAFB233-063F-42B5-8137-9DF3F51BA10A}">
-      <p15:sldGuideLst xmlns:p15="http://schemas.microsoft.com/office/powerpoint/2012/main" xmlns="">
+      <p15:sldGuideLst xmlns:p15="http://schemas.microsoft.com/office/powerpoint/2012/main">
         <p15:guide id="1" orient="horz" pos="1620">
           <p15:clr>
             <a:srgbClr val="A4A3A4"/>
@@ -209,7 +209,7 @@
             <a:fld id="{40637A30-8EE1-4060-9976-8832FC89EE34}" type="datetimeFigureOut">
               <a:rPr lang="nb-NO" smtClean="0"/>
               <a:pPr/>
-              <a:t>03.01.2025</a:t>
+              <a:t>04.01.2025</a:t>
             </a:fld>
             <a:endParaRPr lang="nb-NO"/>
           </a:p>
@@ -3799,7 +3799,7 @@
           <p:cNvPr id="28" name="Kép 27">
             <a:extLst>
               <a:ext uri="{FF2B5EF4-FFF2-40B4-BE49-F238E27FC236}">
-                <a16:creationId xmlns:a16="http://schemas.microsoft.com/office/drawing/2014/main" xmlns="" id="{B4B9A08F-DAC1-BB52-5D76-5BE461FAF252}"/>
+                <a16:creationId xmlns:a16="http://schemas.microsoft.com/office/drawing/2014/main" id="{B4B9A08F-DAC1-BB52-5D76-5BE461FAF252}"/>
               </a:ext>
             </a:extLst>
           </p:cNvPr>
@@ -3829,7 +3829,7 @@
           <p:cNvPr id="24" name="Kép 23">
             <a:extLst>
               <a:ext uri="{FF2B5EF4-FFF2-40B4-BE49-F238E27FC236}">
-                <a16:creationId xmlns:a16="http://schemas.microsoft.com/office/drawing/2014/main" xmlns="" id="{E8DD9508-0C78-0302-EB78-03949F07A04C}"/>
+                <a16:creationId xmlns:a16="http://schemas.microsoft.com/office/drawing/2014/main" id="{E8DD9508-0C78-0302-EB78-03949F07A04C}"/>
               </a:ext>
             </a:extLst>
           </p:cNvPr>
@@ -3998,22 +3998,7 @@
                   <a:schemeClr val="tx1"/>
                 </a:solidFill>
               </a:rPr>
-              <a:t>A - PILLAR</a:t>
-            </a:r>
-            <a:endParaRPr lang="pl-PL" sz="1100">
-              <a:solidFill>
-                <a:schemeClr val="tx1"/>
-              </a:solidFill>
-            </a:endParaRPr>
-          </a:p>
-          <a:p>
-            <a:r>
-              <a:rPr lang="pt-BR" sz="1100" b="1">
-                <a:solidFill>
-                  <a:schemeClr val="tx1"/>
-                </a:solidFill>
-              </a:rPr>
-              <a:t>DPI1 </a:t>
+              <a:t>A – PILLAR – </a:t>
             </a:r>
             <a:r>
               <a:rPr lang="hu-HU" sz="1100">
@@ -4146,7 +4131,7 @@
           <p:cNvPr id="21" name="Prostokąt 33">
             <a:extLst>
               <a:ext uri="{FF2B5EF4-FFF2-40B4-BE49-F238E27FC236}">
-                <a16:creationId xmlns:a16="http://schemas.microsoft.com/office/drawing/2014/main" xmlns="" id="{E49849C0-5340-FFB1-A5AC-D1BDAE90C0E4}"/>
+                <a16:creationId xmlns:a16="http://schemas.microsoft.com/office/drawing/2014/main" id="{E49849C0-5340-FFB1-A5AC-D1BDAE90C0E4}"/>
               </a:ext>
             </a:extLst>
           </p:cNvPr>
@@ -4285,7 +4270,7 @@
           <p:cNvPr id="33" name="Prostokąt 36">
             <a:extLst>
               <a:ext uri="{FF2B5EF4-FFF2-40B4-BE49-F238E27FC236}">
-                <a16:creationId xmlns:a16="http://schemas.microsoft.com/office/drawing/2014/main" xmlns="" id="{436C7B94-5D55-3D78-833F-99BA8488EC5C}"/>
+                <a16:creationId xmlns:a16="http://schemas.microsoft.com/office/drawing/2014/main" id="{436C7B94-5D55-3D78-833F-99BA8488EC5C}"/>
               </a:ext>
             </a:extLst>
           </p:cNvPr>
@@ -4390,7 +4375,7 @@
           <p:cNvPr id="39" name="Háromszög 38">
             <a:extLst>
               <a:ext uri="{FF2B5EF4-FFF2-40B4-BE49-F238E27FC236}">
-                <a16:creationId xmlns:a16="http://schemas.microsoft.com/office/drawing/2014/main" xmlns="" id="{599FE571-AEAA-6E24-C9CB-1CDF64FC0761}"/>
+                <a16:creationId xmlns:a16="http://schemas.microsoft.com/office/drawing/2014/main" id="{599FE571-AEAA-6E24-C9CB-1CDF64FC0761}"/>
               </a:ext>
             </a:extLst>
           </p:cNvPr>
@@ -4442,7 +4427,7 @@
           <p:cNvPr id="51" name="Téglalap 50">
             <a:extLst>
               <a:ext uri="{FF2B5EF4-FFF2-40B4-BE49-F238E27FC236}">
-                <a16:creationId xmlns:a16="http://schemas.microsoft.com/office/drawing/2014/main" xmlns="" id="{849F8394-CDE0-9EB4-0A10-314515E83EC0}"/>
+                <a16:creationId xmlns:a16="http://schemas.microsoft.com/office/drawing/2014/main" id="{849F8394-CDE0-9EB4-0A10-314515E83EC0}"/>
               </a:ext>
             </a:extLst>
           </p:cNvPr>
@@ -4483,7 +4468,7 @@
                   </a:outerShdw>
                 </a:effectLst>
               </a:rPr>
-              <a:t>1</a:t>
+              <a:t>A</a:t>
             </a:r>
           </a:p>
         </p:txBody>
@@ -4493,7 +4478,7 @@
           <p:cNvPr id="4" name="Kép 3">
             <a:extLst>
               <a:ext uri="{FF2B5EF4-FFF2-40B4-BE49-F238E27FC236}">
-                <a16:creationId xmlns:a16="http://schemas.microsoft.com/office/drawing/2014/main" xmlns="" id="{2582332E-BE2D-6281-C5B6-D4E7E034C860}"/>
+                <a16:creationId xmlns:a16="http://schemas.microsoft.com/office/drawing/2014/main" id="{2582332E-BE2D-6281-C5B6-D4E7E034C860}"/>
               </a:ext>
             </a:extLst>
           </p:cNvPr>
@@ -4506,7 +4491,7 @@
           <a:blip r:embed="rId4" cstate="print">
             <a:extLst>
               <a:ext uri="{28A0092B-C50C-407E-A947-70E740481C1C}">
-                <a14:useLocalDpi xmlns:a14="http://schemas.microsoft.com/office/drawing/2010/main" xmlns="" val="0"/>
+                <a14:useLocalDpi xmlns:a14="http://schemas.microsoft.com/office/drawing/2010/main" val="0"/>
               </a:ext>
             </a:extLst>
           </a:blip>
@@ -4529,7 +4514,7 @@
           <p:cNvPr id="6" name="Kép 5">
             <a:extLst>
               <a:ext uri="{FF2B5EF4-FFF2-40B4-BE49-F238E27FC236}">
-                <a16:creationId xmlns:a16="http://schemas.microsoft.com/office/drawing/2014/main" xmlns="" id="{8F557E24-D936-7AF1-2207-47EEDE09D66A}"/>
+                <a16:creationId xmlns:a16="http://schemas.microsoft.com/office/drawing/2014/main" id="{8F557E24-D936-7AF1-2207-47EEDE09D66A}"/>
               </a:ext>
             </a:extLst>
           </p:cNvPr>
@@ -4542,7 +4527,7 @@
           <a:blip r:embed="rId5" cstate="print">
             <a:extLst>
               <a:ext uri="{28A0092B-C50C-407E-A947-70E740481C1C}">
-                <a14:useLocalDpi xmlns:a14="http://schemas.microsoft.com/office/drawing/2010/main" xmlns="" val="0"/>
+                <a14:useLocalDpi xmlns:a14="http://schemas.microsoft.com/office/drawing/2010/main" val="0"/>
               </a:ext>
             </a:extLst>
           </a:blip>

</xml_diff>